<commit_message>
small edits to ppt
</commit_message>
<xml_diff>
--- a/UFO_presidentalElections.pptx
+++ b/UFO_presidentalElections.pptx
@@ -118,12 +118,86 @@
 </p:presentation>
 </file>
 
-<file path=ppt/revisionInfo.xml><?xml version="1.0" encoding="utf-8"?>
-<p1510:revInfo xmlns:a="http://schemas.openxmlformats.org/drawingml/2006/main" xmlns:r="http://schemas.openxmlformats.org/officeDocument/2006/relationships" xmlns:p1510="http://schemas.microsoft.com/office/powerpoint/2015/10/main">
-  <p1510:revLst>
-    <p1510:client id="{443C3D19-5950-A54C-9287-34E2EE7B768F}" v="2" dt="2020-10-06T15:20:02.443"/>
-  </p1510:revLst>
-</p1510:revInfo>
+<file path=ppt/changesInfos/changesInfo1.xml><?xml version="1.0" encoding="utf-8"?>
+<pc:chgInfo xmlns:a="http://schemas.openxmlformats.org/drawingml/2006/main" xmlns:r="http://schemas.openxmlformats.org/officeDocument/2006/relationships" xmlns:ac="http://schemas.microsoft.com/office/drawing/2013/main/command" xmlns:pc="http://schemas.microsoft.com/office/powerpoint/2013/main/command">
+  <pc:docChgLst>
+    <pc:chgData name="Kara Wolley" userId="094e82877b283422" providerId="LiveId" clId="{41D813B1-577A-421E-8286-7F7A49047DF9}"/>
+    <pc:docChg chg="custSel modSld">
+      <pc:chgData name="Kara Wolley" userId="094e82877b283422" providerId="LiveId" clId="{41D813B1-577A-421E-8286-7F7A49047DF9}" dt="2020-10-07T22:58:01.909" v="92" actId="1076"/>
+      <pc:docMkLst>
+        <pc:docMk/>
+      </pc:docMkLst>
+      <pc:sldChg chg="modSp mod">
+        <pc:chgData name="Kara Wolley" userId="094e82877b283422" providerId="LiveId" clId="{41D813B1-577A-421E-8286-7F7A49047DF9}" dt="2020-10-07T22:48:50.316" v="54" actId="1076"/>
+        <pc:sldMkLst>
+          <pc:docMk/>
+          <pc:sldMk cId="2904675177" sldId="257"/>
+        </pc:sldMkLst>
+        <pc:spChg chg="mod">
+          <ac:chgData name="Kara Wolley" userId="094e82877b283422" providerId="LiveId" clId="{41D813B1-577A-421E-8286-7F7A49047DF9}" dt="2020-10-07T22:48:50.316" v="54" actId="1076"/>
+          <ac:spMkLst>
+            <pc:docMk/>
+            <pc:sldMk cId="2904675177" sldId="257"/>
+            <ac:spMk id="2" creationId="{5E6E1657-08ED-164A-9C65-095976CADB3F}"/>
+          </ac:spMkLst>
+        </pc:spChg>
+        <pc:spChg chg="mod">
+          <ac:chgData name="Kara Wolley" userId="094e82877b283422" providerId="LiveId" clId="{41D813B1-577A-421E-8286-7F7A49047DF9}" dt="2020-10-07T22:48:47.205" v="53" actId="1076"/>
+          <ac:spMkLst>
+            <pc:docMk/>
+            <pc:sldMk cId="2904675177" sldId="257"/>
+            <ac:spMk id="3" creationId="{6487D02E-0A19-BE4F-A7E7-598A7E2084ED}"/>
+          </ac:spMkLst>
+        </pc:spChg>
+      </pc:sldChg>
+      <pc:sldChg chg="modSp mod">
+        <pc:chgData name="Kara Wolley" userId="094e82877b283422" providerId="LiveId" clId="{41D813B1-577A-421E-8286-7F7A49047DF9}" dt="2020-10-07T22:57:47.285" v="91" actId="6549"/>
+        <pc:sldMkLst>
+          <pc:docMk/>
+          <pc:sldMk cId="4040745095" sldId="260"/>
+        </pc:sldMkLst>
+        <pc:spChg chg="mod">
+          <ac:chgData name="Kara Wolley" userId="094e82877b283422" providerId="LiveId" clId="{41D813B1-577A-421E-8286-7F7A49047DF9}" dt="2020-10-07T22:57:47.285" v="91" actId="6549"/>
+          <ac:spMkLst>
+            <pc:docMk/>
+            <pc:sldMk cId="4040745095" sldId="260"/>
+            <ac:spMk id="3" creationId="{587C1E35-81E9-8941-AE54-B44519A4A7FF}"/>
+          </ac:spMkLst>
+        </pc:spChg>
+      </pc:sldChg>
+      <pc:sldChg chg="modSp mod">
+        <pc:chgData name="Kara Wolley" userId="094e82877b283422" providerId="LiveId" clId="{41D813B1-577A-421E-8286-7F7A49047DF9}" dt="2020-10-07T22:58:01.909" v="92" actId="1076"/>
+        <pc:sldMkLst>
+          <pc:docMk/>
+          <pc:sldMk cId="818987504" sldId="261"/>
+        </pc:sldMkLst>
+        <pc:spChg chg="mod">
+          <ac:chgData name="Kara Wolley" userId="094e82877b283422" providerId="LiveId" clId="{41D813B1-577A-421E-8286-7F7A49047DF9}" dt="2020-10-07T22:58:01.909" v="92" actId="1076"/>
+          <ac:spMkLst>
+            <pc:docMk/>
+            <pc:sldMk cId="818987504" sldId="261"/>
+            <ac:spMk id="3" creationId="{63CDF0F7-E4FE-5E4A-B1A6-6715958B71AA}"/>
+          </ac:spMkLst>
+        </pc:spChg>
+      </pc:sldChg>
+      <pc:sldChg chg="modSp mod">
+        <pc:chgData name="Kara Wolley" userId="094e82877b283422" providerId="LiveId" clId="{41D813B1-577A-421E-8286-7F7A49047DF9}" dt="2020-10-07T22:57:41.447" v="90" actId="6549"/>
+        <pc:sldMkLst>
+          <pc:docMk/>
+          <pc:sldMk cId="1217790128" sldId="262"/>
+        </pc:sldMkLst>
+        <pc:spChg chg="mod">
+          <ac:chgData name="Kara Wolley" userId="094e82877b283422" providerId="LiveId" clId="{41D813B1-577A-421E-8286-7F7A49047DF9}" dt="2020-10-07T22:57:41.447" v="90" actId="6549"/>
+          <ac:spMkLst>
+            <pc:docMk/>
+            <pc:sldMk cId="1217790128" sldId="262"/>
+            <ac:spMk id="3" creationId="{68558AF0-ED2E-2E4A-8B59-229D61E1E95F}"/>
+          </ac:spMkLst>
+        </pc:spChg>
+      </pc:sldChg>
+    </pc:docChg>
+  </pc:docChgLst>
+</pc:chgInfo>
 </file>
 
 <file path=ppt/slideLayouts/slideLayout1.xml><?xml version="1.0" encoding="utf-8"?>
@@ -275,7 +349,7 @@
           <a:p>
             <a:fld id="{F4D57BDD-E64A-4D27-8978-82FFCA18A12C}" type="datetimeFigureOut">
               <a:rPr lang="en-US" smtClean="0"/>
-              <a:t>10/7/20</a:t>
+              <a:t>10/7/2020</a:t>
             </a:fld>
             <a:endParaRPr lang="en-US"/>
           </a:p>
@@ -484,7 +558,7 @@
           <a:p>
             <a:fld id="{F4D57BDD-E64A-4D27-8978-82FFCA18A12C}" type="datetimeFigureOut">
               <a:rPr lang="en-US" smtClean="0"/>
-              <a:t>10/7/20</a:t>
+              <a:t>10/7/2020</a:t>
             </a:fld>
             <a:endParaRPr lang="en-US"/>
           </a:p>
@@ -692,7 +766,7 @@
           <a:p>
             <a:fld id="{F4D57BDD-E64A-4D27-8978-82FFCA18A12C}" type="datetimeFigureOut">
               <a:rPr lang="en-US" smtClean="0"/>
-              <a:t>10/7/20</a:t>
+              <a:t>10/7/2020</a:t>
             </a:fld>
             <a:endParaRPr lang="en-US"/>
           </a:p>
@@ -890,7 +964,7 @@
           <a:p>
             <a:fld id="{F4D57BDD-E64A-4D27-8978-82FFCA18A12C}" type="datetimeFigureOut">
               <a:rPr lang="en-US" smtClean="0"/>
-              <a:t>10/7/20</a:t>
+              <a:t>10/7/2020</a:t>
             </a:fld>
             <a:endParaRPr lang="en-US"/>
           </a:p>
@@ -1166,7 +1240,7 @@
           <a:p>
             <a:fld id="{F4D57BDD-E64A-4D27-8978-82FFCA18A12C}" type="datetimeFigureOut">
               <a:rPr lang="en-US" smtClean="0"/>
-              <a:t>10/7/20</a:t>
+              <a:t>10/7/2020</a:t>
             </a:fld>
             <a:endParaRPr lang="en-US"/>
           </a:p>
@@ -1438,7 +1512,7 @@
           <a:p>
             <a:fld id="{F4D57BDD-E64A-4D27-8978-82FFCA18A12C}" type="datetimeFigureOut">
               <a:rPr lang="en-US" smtClean="0"/>
-              <a:t>10/7/20</a:t>
+              <a:t>10/7/2020</a:t>
             </a:fld>
             <a:endParaRPr lang="en-US"/>
           </a:p>
@@ -1852,7 +1926,7 @@
           <a:p>
             <a:fld id="{F4D57BDD-E64A-4D27-8978-82FFCA18A12C}" type="datetimeFigureOut">
               <a:rPr lang="en-US" smtClean="0"/>
-              <a:t>10/7/20</a:t>
+              <a:t>10/7/2020</a:t>
             </a:fld>
             <a:endParaRPr lang="en-US"/>
           </a:p>
@@ -1999,7 +2073,7 @@
           <a:p>
             <a:fld id="{F4D57BDD-E64A-4D27-8978-82FFCA18A12C}" type="datetimeFigureOut">
               <a:rPr lang="en-US" smtClean="0"/>
-              <a:t>10/7/20</a:t>
+              <a:t>10/7/2020</a:t>
             </a:fld>
             <a:endParaRPr lang="en-US"/>
           </a:p>
@@ -2112,7 +2186,7 @@
           <a:p>
             <a:fld id="{F4D57BDD-E64A-4D27-8978-82FFCA18A12C}" type="datetimeFigureOut">
               <a:rPr lang="en-US" smtClean="0"/>
-              <a:t>10/7/20</a:t>
+              <a:t>10/7/2020</a:t>
             </a:fld>
             <a:endParaRPr lang="en-US"/>
           </a:p>
@@ -2424,7 +2498,7 @@
           <a:p>
             <a:fld id="{F4D57BDD-E64A-4D27-8978-82FFCA18A12C}" type="datetimeFigureOut">
               <a:rPr lang="en-US" smtClean="0"/>
-              <a:t>10/7/20</a:t>
+              <a:t>10/7/2020</a:t>
             </a:fld>
             <a:endParaRPr lang="en-US"/>
           </a:p>
@@ -2715,7 +2789,7 @@
           <a:p>
             <a:fld id="{F4D57BDD-E64A-4D27-8978-82FFCA18A12C}" type="datetimeFigureOut">
               <a:rPr lang="en-US" smtClean="0"/>
-              <a:t>10/7/20</a:t>
+              <a:t>10/7/2020</a:t>
             </a:fld>
             <a:endParaRPr lang="en-US"/>
           </a:p>
@@ -2957,7 +3031,7 @@
             <a:fld id="{F4D57BDD-E64A-4D27-8978-82FFCA18A12C}" type="datetimeFigureOut">
               <a:rPr lang="en-US" smtClean="0"/>
               <a:pPr/>
-              <a:t>10/7/20</a:t>
+              <a:t>10/7/2020</a:t>
             </a:fld>
             <a:endParaRPr lang="en-US" dirty="0"/>
           </a:p>
@@ -3711,7 +3785,12 @@
             <p:ph type="title"/>
           </p:nvPr>
         </p:nvSpPr>
-        <p:spPr/>
+        <p:spPr>
+          <a:xfrm>
+            <a:off x="629479" y="1101863"/>
+            <a:ext cx="9144000" cy="1263649"/>
+          </a:xfrm>
+        </p:spPr>
         <p:txBody>
           <a:bodyPr/>
           <a:lstStyle/>
@@ -3741,7 +3820,7 @@
         </p:nvSpPr>
         <p:spPr>
           <a:xfrm>
-            <a:off x="762000" y="2438401"/>
+            <a:off x="762000" y="2091910"/>
             <a:ext cx="10668000" cy="3657600"/>
           </a:xfrm>
         </p:spPr>
@@ -3753,7 +3832,25 @@
           <a:p>
             <a:r>
               <a:rPr lang="en-US" sz="2000" dirty="0"/>
-              <a:t>Our primary goal is to investigate trends in UFO sightings in the United States by better understanding patterns of sightings, occurrences and sighting location. We also look at trends in UFO shape (circle, oval) to better understand advances in alien technology or at least how human perception of aliens have changed over time. Then, we predict where and when UFO sightings occur based on the outcomes of US presidential and general elections.</a:t>
+              <a:t>Investigate trends in UFO sightings in the United States</a:t>
+            </a:r>
+          </a:p>
+          <a:p>
+            <a:r>
+              <a:rPr lang="en-US" sz="2000" dirty="0"/>
+              <a:t>Better understand patterns of sightings, occurrences and sighting location</a:t>
+            </a:r>
+          </a:p>
+          <a:p>
+            <a:r>
+              <a:rPr lang="en-US" sz="2000" dirty="0"/>
+              <a:t>Identify trends in UFO shape to better understand advances in alien technology or at least how human perception of aliens have changed over time. </a:t>
+            </a:r>
+          </a:p>
+          <a:p>
+            <a:r>
+              <a:rPr lang="en-US" sz="2000" dirty="0"/>
+              <a:t>Predict where and when UFO sightings occur based on the outcomes of US presidential and general elections.</a:t>
             </a:r>
           </a:p>
         </p:txBody>
@@ -4147,12 +4244,8 @@
           <a:p>
             <a:r>
               <a:rPr lang="en-US" sz="2000" dirty="0"/>
-              <a:t>The merged dataset is currently on Sam’s computer as well as on our GitHub page</a:t>
-            </a:r>
-          </a:p>
-          <a:p>
-            <a:pPr lvl="1"/>
-            <a:endParaRPr lang="en-US" sz="2000" dirty="0"/>
+              <a:t>The merged dataset (“merged_ufo_elect_data.csv”) can be found on our GitHub</a:t>
+            </a:r>
           </a:p>
         </p:txBody>
       </p:sp>
@@ -4264,15 +4357,7 @@
             <a:pPr lvl="1"/>
             <a:r>
               <a:rPr lang="en-US" sz="1600" dirty="0"/>
-              <a:t>Correct for missing v </a:t>
-            </a:r>
-            <a:r>
-              <a:rPr lang="en-US" sz="1600" dirty="0" err="1"/>
-              <a:t>alues</a:t>
-            </a:r>
-            <a:r>
-              <a:rPr lang="en-US" sz="1600" dirty="0"/>
-              <a:t>. Some values may remain null, but many are predictable, such as if the 'county' value for a row of data is blank, but we know the state is 'TX,' it's safe to input the USA for the country value.</a:t>
+              <a:t>Correct for missing values. Some values may remain null, but many are predictable, such as if the 'county' value for a row of data is blank, but we know the state is 'TX,' it's safe to input the USA for the country value.</a:t>
             </a:r>
           </a:p>
           <a:p>
@@ -4367,7 +4452,12 @@
             <p:ph idx="1"/>
           </p:nvPr>
         </p:nvSpPr>
-        <p:spPr/>
+        <p:spPr>
+          <a:xfrm>
+            <a:off x="762000" y="2546351"/>
+            <a:ext cx="10668000" cy="3048001"/>
+          </a:xfrm>
+        </p:spPr>
         <p:txBody>
           <a:bodyPr>
             <a:normAutofit/>

</xml_diff>

<commit_message>
Added evaluation/tools section and a few edits
</commit_message>
<xml_diff>
--- a/UFO_presidentalElections.pptx
+++ b/UFO_presidentalElections.pptx
@@ -11,7 +11,8 @@
     <p:sldId id="259" r:id="rId5"/>
     <p:sldId id="262" r:id="rId6"/>
     <p:sldId id="260" r:id="rId7"/>
-    <p:sldId id="261" r:id="rId8"/>
+    <p:sldId id="263" r:id="rId8"/>
+    <p:sldId id="261" r:id="rId9"/>
   </p:sldIdLst>
   <p:sldSz cx="12192000" cy="6858000"/>
   <p:notesSz cx="6858000" cy="9144000"/>
@@ -349,7 +350,7 @@
           <a:p>
             <a:fld id="{F4D57BDD-E64A-4D27-8978-82FFCA18A12C}" type="datetimeFigureOut">
               <a:rPr lang="en-US" smtClean="0"/>
-              <a:t>10/7/2020</a:t>
+              <a:t>10/7/20</a:t>
             </a:fld>
             <a:endParaRPr lang="en-US"/>
           </a:p>
@@ -558,7 +559,7 @@
           <a:p>
             <a:fld id="{F4D57BDD-E64A-4D27-8978-82FFCA18A12C}" type="datetimeFigureOut">
               <a:rPr lang="en-US" smtClean="0"/>
-              <a:t>10/7/2020</a:t>
+              <a:t>10/7/20</a:t>
             </a:fld>
             <a:endParaRPr lang="en-US"/>
           </a:p>
@@ -766,7 +767,7 @@
           <a:p>
             <a:fld id="{F4D57BDD-E64A-4D27-8978-82FFCA18A12C}" type="datetimeFigureOut">
               <a:rPr lang="en-US" smtClean="0"/>
-              <a:t>10/7/2020</a:t>
+              <a:t>10/7/20</a:t>
             </a:fld>
             <a:endParaRPr lang="en-US"/>
           </a:p>
@@ -964,7 +965,7 @@
           <a:p>
             <a:fld id="{F4D57BDD-E64A-4D27-8978-82FFCA18A12C}" type="datetimeFigureOut">
               <a:rPr lang="en-US" smtClean="0"/>
-              <a:t>10/7/2020</a:t>
+              <a:t>10/7/20</a:t>
             </a:fld>
             <a:endParaRPr lang="en-US"/>
           </a:p>
@@ -1240,7 +1241,7 @@
           <a:p>
             <a:fld id="{F4D57BDD-E64A-4D27-8978-82FFCA18A12C}" type="datetimeFigureOut">
               <a:rPr lang="en-US" smtClean="0"/>
-              <a:t>10/7/2020</a:t>
+              <a:t>10/7/20</a:t>
             </a:fld>
             <a:endParaRPr lang="en-US"/>
           </a:p>
@@ -1512,7 +1513,7 @@
           <a:p>
             <a:fld id="{F4D57BDD-E64A-4D27-8978-82FFCA18A12C}" type="datetimeFigureOut">
               <a:rPr lang="en-US" smtClean="0"/>
-              <a:t>10/7/2020</a:t>
+              <a:t>10/7/20</a:t>
             </a:fld>
             <a:endParaRPr lang="en-US"/>
           </a:p>
@@ -1926,7 +1927,7 @@
           <a:p>
             <a:fld id="{F4D57BDD-E64A-4D27-8978-82FFCA18A12C}" type="datetimeFigureOut">
               <a:rPr lang="en-US" smtClean="0"/>
-              <a:t>10/7/2020</a:t>
+              <a:t>10/7/20</a:t>
             </a:fld>
             <a:endParaRPr lang="en-US"/>
           </a:p>
@@ -2073,7 +2074,7 @@
           <a:p>
             <a:fld id="{F4D57BDD-E64A-4D27-8978-82FFCA18A12C}" type="datetimeFigureOut">
               <a:rPr lang="en-US" smtClean="0"/>
-              <a:t>10/7/2020</a:t>
+              <a:t>10/7/20</a:t>
             </a:fld>
             <a:endParaRPr lang="en-US"/>
           </a:p>
@@ -2186,7 +2187,7 @@
           <a:p>
             <a:fld id="{F4D57BDD-E64A-4D27-8978-82FFCA18A12C}" type="datetimeFigureOut">
               <a:rPr lang="en-US" smtClean="0"/>
-              <a:t>10/7/2020</a:t>
+              <a:t>10/7/20</a:t>
             </a:fld>
             <a:endParaRPr lang="en-US"/>
           </a:p>
@@ -2498,7 +2499,7 @@
           <a:p>
             <a:fld id="{F4D57BDD-E64A-4D27-8978-82FFCA18A12C}" type="datetimeFigureOut">
               <a:rPr lang="en-US" smtClean="0"/>
-              <a:t>10/7/2020</a:t>
+              <a:t>10/7/20</a:t>
             </a:fld>
             <a:endParaRPr lang="en-US"/>
           </a:p>
@@ -2789,7 +2790,7 @@
           <a:p>
             <a:fld id="{F4D57BDD-E64A-4D27-8978-82FFCA18A12C}" type="datetimeFigureOut">
               <a:rPr lang="en-US" smtClean="0"/>
-              <a:t>10/7/2020</a:t>
+              <a:t>10/7/20</a:t>
             </a:fld>
             <a:endParaRPr lang="en-US"/>
           </a:p>
@@ -3031,7 +3032,7 @@
             <a:fld id="{F4D57BDD-E64A-4D27-8978-82FFCA18A12C}" type="datetimeFigureOut">
               <a:rPr lang="en-US" smtClean="0"/>
               <a:pPr/>
-              <a:t>10/7/2020</a:t>
+              <a:t>10/7/20</a:t>
             </a:fld>
             <a:endParaRPr lang="en-US" dirty="0"/>
           </a:p>
@@ -3656,7 +3657,7 @@
         </p:spPr>
         <p:txBody>
           <a:bodyPr anchor="ctr">
-            <a:normAutofit/>
+            <a:normAutofit fontScale="90000"/>
           </a:bodyPr>
           <a:lstStyle/>
           <a:p>
@@ -3666,7 +3667,7 @@
                   <a:srgbClr val="FFFFFF"/>
                 </a:solidFill>
               </a:rPr>
-              <a:t>Investigating Trends in UFO sightings and US elections</a:t>
+              <a:t>UFOs and Presidential Elections: Are they more related than we think?</a:t>
             </a:r>
           </a:p>
         </p:txBody>
@@ -3961,7 +3962,7 @@
           <a:p>
             <a:r>
               <a:rPr lang="en-US" sz="2000" dirty="0"/>
-              <a:t>In states that vote Republican are there more or less UFO sightings?</a:t>
+              <a:t>Are there more or less UFO sightings in states that vote Republican? Democrat?</a:t>
             </a:r>
           </a:p>
           <a:p>
@@ -4244,7 +4245,7 @@
           <a:p>
             <a:r>
               <a:rPr lang="en-US" sz="2000" dirty="0"/>
-              <a:t>The merged dataset (“merged_ufo_elect_data.csv”) can be found on our GitHub</a:t>
+              <a:t>The merged dataset (“merged_ufo_elect_data.csv”) can be found on our GitHub, it contains key information from both datasets for easier analysis. </a:t>
             </a:r>
           </a:p>
         </p:txBody>
@@ -4413,6 +4414,144 @@
           <p:cNvPr id="2" name="Title 1">
             <a:extLst>
               <a:ext uri="{FF2B5EF4-FFF2-40B4-BE49-F238E27FC236}">
+                <a16:creationId xmlns:a16="http://schemas.microsoft.com/office/drawing/2014/main" id="{A3F9D3DB-B2FC-F64F-BDBC-44089579E990}"/>
+              </a:ext>
+            </a:extLst>
+          </p:cNvPr>
+          <p:cNvSpPr>
+            <a:spLocks noGrp="1"/>
+          </p:cNvSpPr>
+          <p:nvPr>
+            <p:ph type="title"/>
+          </p:nvPr>
+        </p:nvSpPr>
+        <p:spPr/>
+        <p:txBody>
+          <a:bodyPr/>
+          <a:lstStyle/>
+          <a:p>
+            <a:r>
+              <a:rPr lang="en-US" dirty="0"/>
+              <a:t>Tools</a:t>
+            </a:r>
+          </a:p>
+        </p:txBody>
+      </p:sp>
+      <p:sp>
+        <p:nvSpPr>
+          <p:cNvPr id="3" name="Content Placeholder 2">
+            <a:extLst>
+              <a:ext uri="{FF2B5EF4-FFF2-40B4-BE49-F238E27FC236}">
+                <a16:creationId xmlns:a16="http://schemas.microsoft.com/office/drawing/2014/main" id="{2F3C2FBA-C650-6741-B53F-5191F083B48E}"/>
+              </a:ext>
+            </a:extLst>
+          </p:cNvPr>
+          <p:cNvSpPr>
+            <a:spLocks noGrp="1"/>
+          </p:cNvSpPr>
+          <p:nvPr>
+            <p:ph idx="1"/>
+          </p:nvPr>
+        </p:nvSpPr>
+        <p:spPr/>
+        <p:txBody>
+          <a:bodyPr/>
+          <a:lstStyle/>
+          <a:p>
+            <a:r>
+              <a:rPr lang="en-US" dirty="0"/>
+              <a:t>So far we have used </a:t>
+            </a:r>
+            <a:r>
+              <a:rPr lang="en-US" dirty="0" err="1"/>
+              <a:t>Jupyter</a:t>
+            </a:r>
+            <a:r>
+              <a:rPr lang="en-US" dirty="0"/>
+              <a:t> Notebook, Python and the Pandas/</a:t>
+            </a:r>
+            <a:r>
+              <a:rPr lang="en-US" dirty="0" err="1"/>
+              <a:t>Numpy</a:t>
+            </a:r>
+            <a:r>
+              <a:rPr lang="en-US" dirty="0"/>
+              <a:t> libraries for merging the datasets.</a:t>
+            </a:r>
+          </a:p>
+          <a:p>
+            <a:r>
+              <a:rPr lang="en-US" dirty="0"/>
+              <a:t>Tools we might use later in the project are:</a:t>
+            </a:r>
+          </a:p>
+          <a:p>
+            <a:pPr lvl="1"/>
+            <a:r>
+              <a:rPr lang="en-US" dirty="0"/>
+              <a:t>Tableau- Data Visualization</a:t>
+            </a:r>
+          </a:p>
+          <a:p>
+            <a:pPr lvl="1"/>
+            <a:r>
+              <a:rPr lang="en-US" dirty="0"/>
+              <a:t>Matplotlib, </a:t>
+            </a:r>
+            <a:r>
+              <a:rPr lang="en-US" dirty="0" err="1"/>
+              <a:t>Sklearn</a:t>
+            </a:r>
+            <a:r>
+              <a:rPr lang="en-US" dirty="0"/>
+              <a:t> – Data Analysis</a:t>
+            </a:r>
+          </a:p>
+          <a:p>
+            <a:pPr lvl="1"/>
+            <a:endParaRPr lang="en-US" dirty="0"/>
+          </a:p>
+          <a:p>
+            <a:pPr lvl="1"/>
+            <a:endParaRPr lang="en-US" dirty="0"/>
+          </a:p>
+        </p:txBody>
+      </p:sp>
+    </p:spTree>
+    <p:extLst>
+      <p:ext uri="{BB962C8B-B14F-4D97-AF65-F5344CB8AC3E}">
+        <p14:creationId xmlns:p14="http://schemas.microsoft.com/office/powerpoint/2010/main" val="136086394"/>
+      </p:ext>
+    </p:extLst>
+  </p:cSld>
+  <p:clrMapOvr>
+    <a:masterClrMapping/>
+  </p:clrMapOvr>
+</p:sld>
+</file>
+
+<file path=ppt/slides/slide8.xml><?xml version="1.0" encoding="utf-8"?>
+<p:sld xmlns:a="http://schemas.openxmlformats.org/drawingml/2006/main" xmlns:r="http://schemas.openxmlformats.org/officeDocument/2006/relationships" xmlns:p="http://schemas.openxmlformats.org/presentationml/2006/main">
+  <p:cSld>
+    <p:spTree>
+      <p:nvGrpSpPr>
+        <p:cNvPr id="1" name=""/>
+        <p:cNvGrpSpPr/>
+        <p:nvPr/>
+      </p:nvGrpSpPr>
+      <p:grpSpPr>
+        <a:xfrm>
+          <a:off x="0" y="0"/>
+          <a:ext cx="0" cy="0"/>
+          <a:chOff x="0" y="0"/>
+          <a:chExt cx="0" cy="0"/>
+        </a:xfrm>
+      </p:grpSpPr>
+      <p:sp>
+        <p:nvSpPr>
+          <p:cNvPr id="2" name="Title 1">
+            <a:extLst>
+              <a:ext uri="{FF2B5EF4-FFF2-40B4-BE49-F238E27FC236}">
                 <a16:creationId xmlns:a16="http://schemas.microsoft.com/office/drawing/2014/main" id="{A91EC7C7-B6B3-1B42-B548-E24B98800315}"/>
               </a:ext>
             </a:extLst>
@@ -4460,32 +4599,24 @@
         </p:spPr>
         <p:txBody>
           <a:bodyPr>
-            <a:normAutofit/>
+            <a:normAutofit fontScale="92500"/>
           </a:bodyPr>
           <a:lstStyle/>
           <a:p>
+            <a:pPr marL="0" indent="0">
+              <a:buNone/>
+            </a:pPr>
             <a:r>
               <a:rPr lang="en-US" dirty="0"/>
-              <a:t>Histogram</a:t>
-            </a:r>
-          </a:p>
-          <a:p>
+              <a:t>We’ll consider our project successful if we can find answers to the questions outlined, even if the trends discovered (or lack of a trend) don’t match our expectations. To evaluate the data for evaluation we will use Histograms, Heatmaps, </a:t>
+            </a:r>
+            <a:r>
+              <a:rPr lang="en-US" dirty="0" err="1"/>
+              <a:t>Apriori</a:t>
+            </a:r>
             <a:r>
               <a:rPr lang="en-US" dirty="0"/>
-              <a:t>Heatmap</a:t>
-            </a:r>
-          </a:p>
-          <a:p>
-            <a:r>
-              <a:rPr lang="en-US" dirty="0" err="1"/>
-              <a:t>Apiori</a:t>
-            </a:r>
-            <a:endParaRPr lang="en-US" dirty="0"/>
-          </a:p>
-          <a:p>
-            <a:r>
-              <a:rPr lang="en-US" dirty="0"/>
-              <a:t>Gain/lift</a:t>
+              <a:t> frequency assessment, and Gain/Lift charts, and confidence intervals to find trends and correlations between UFO sightings and presidential election results in each county of the US. </a:t>
             </a:r>
           </a:p>
         </p:txBody>

</xml_diff>

<commit_message>
added tools, edited evaluation
</commit_message>
<xml_diff>
--- a/UFO_presidentalElections.pptx
+++ b/UFO_presidentalElections.pptx
@@ -12,6 +12,7 @@
     <p:sldId id="262" r:id="rId6"/>
     <p:sldId id="260" r:id="rId7"/>
     <p:sldId id="261" r:id="rId8"/>
+    <p:sldId id="263" r:id="rId9"/>
   </p:sldIdLst>
   <p:sldSz cx="12192000" cy="6858000"/>
   <p:notesSz cx="6858000" cy="9144000"/>
@@ -122,8 +123,8 @@
 <pc:chgInfo xmlns:a="http://schemas.openxmlformats.org/drawingml/2006/main" xmlns:r="http://schemas.openxmlformats.org/officeDocument/2006/relationships" xmlns:ac="http://schemas.microsoft.com/office/drawing/2013/main/command" xmlns:pc="http://schemas.microsoft.com/office/powerpoint/2013/main/command">
   <pc:docChgLst>
     <pc:chgData name="Kara Wolley" userId="094e82877b283422" providerId="LiveId" clId="{41D813B1-577A-421E-8286-7F7A49047DF9}"/>
-    <pc:docChg chg="custSel modSld">
-      <pc:chgData name="Kara Wolley" userId="094e82877b283422" providerId="LiveId" clId="{41D813B1-577A-421E-8286-7F7A49047DF9}" dt="2020-10-07T22:58:01.909" v="92" actId="1076"/>
+    <pc:docChg chg="custSel addSld modSld">
+      <pc:chgData name="Kara Wolley" userId="094e82877b283422" providerId="LiveId" clId="{41D813B1-577A-421E-8286-7F7A49047DF9}" dt="2020-10-09T17:32:09.065" v="1292" actId="1076"/>
       <pc:docMkLst>
         <pc:docMk/>
       </pc:docMkLst>
@@ -151,13 +152,28 @@
         </pc:spChg>
       </pc:sldChg>
       <pc:sldChg chg="modSp mod">
-        <pc:chgData name="Kara Wolley" userId="094e82877b283422" providerId="LiveId" clId="{41D813B1-577A-421E-8286-7F7A49047DF9}" dt="2020-10-07T22:57:47.285" v="91" actId="6549"/>
+        <pc:chgData name="Kara Wolley" userId="094e82877b283422" providerId="LiveId" clId="{41D813B1-577A-421E-8286-7F7A49047DF9}" dt="2020-10-09T17:11:30.372" v="119" actId="20577"/>
+        <pc:sldMkLst>
+          <pc:docMk/>
+          <pc:sldMk cId="1646485854" sldId="258"/>
+        </pc:sldMkLst>
+        <pc:spChg chg="mod">
+          <ac:chgData name="Kara Wolley" userId="094e82877b283422" providerId="LiveId" clId="{41D813B1-577A-421E-8286-7F7A49047DF9}" dt="2020-10-09T17:11:30.372" v="119" actId="20577"/>
+          <ac:spMkLst>
+            <pc:docMk/>
+            <pc:sldMk cId="1646485854" sldId="258"/>
+            <ac:spMk id="3" creationId="{FECFBC93-F316-2A46-B38A-83315672A8EA}"/>
+          </ac:spMkLst>
+        </pc:spChg>
+      </pc:sldChg>
+      <pc:sldChg chg="modSp mod">
+        <pc:chgData name="Kara Wolley" userId="094e82877b283422" providerId="LiveId" clId="{41D813B1-577A-421E-8286-7F7A49047DF9}" dt="2020-10-09T17:16:06.050" v="399" actId="20577"/>
         <pc:sldMkLst>
           <pc:docMk/>
           <pc:sldMk cId="4040745095" sldId="260"/>
         </pc:sldMkLst>
         <pc:spChg chg="mod">
-          <ac:chgData name="Kara Wolley" userId="094e82877b283422" providerId="LiveId" clId="{41D813B1-577A-421E-8286-7F7A49047DF9}" dt="2020-10-07T22:57:47.285" v="91" actId="6549"/>
+          <ac:chgData name="Kara Wolley" userId="094e82877b283422" providerId="LiveId" clId="{41D813B1-577A-421E-8286-7F7A49047DF9}" dt="2020-10-09T17:16:06.050" v="399" actId="20577"/>
           <ac:spMkLst>
             <pc:docMk/>
             <pc:sldMk cId="4040745095" sldId="260"/>
@@ -166,13 +182,13 @@
         </pc:spChg>
       </pc:sldChg>
       <pc:sldChg chg="modSp mod">
-        <pc:chgData name="Kara Wolley" userId="094e82877b283422" providerId="LiveId" clId="{41D813B1-577A-421E-8286-7F7A49047DF9}" dt="2020-10-07T22:58:01.909" v="92" actId="1076"/>
+        <pc:chgData name="Kara Wolley" userId="094e82877b283422" providerId="LiveId" clId="{41D813B1-577A-421E-8286-7F7A49047DF9}" dt="2020-10-09T17:23:49.852" v="1246" actId="27636"/>
         <pc:sldMkLst>
           <pc:docMk/>
           <pc:sldMk cId="818987504" sldId="261"/>
         </pc:sldMkLst>
         <pc:spChg chg="mod">
-          <ac:chgData name="Kara Wolley" userId="094e82877b283422" providerId="LiveId" clId="{41D813B1-577A-421E-8286-7F7A49047DF9}" dt="2020-10-07T22:58:01.909" v="92" actId="1076"/>
+          <ac:chgData name="Kara Wolley" userId="094e82877b283422" providerId="LiveId" clId="{41D813B1-577A-421E-8286-7F7A49047DF9}" dt="2020-10-09T17:23:49.852" v="1246" actId="27636"/>
           <ac:spMkLst>
             <pc:docMk/>
             <pc:sldMk cId="818987504" sldId="261"/>
@@ -180,20 +196,91 @@
           </ac:spMkLst>
         </pc:spChg>
       </pc:sldChg>
-      <pc:sldChg chg="modSp mod">
-        <pc:chgData name="Kara Wolley" userId="094e82877b283422" providerId="LiveId" clId="{41D813B1-577A-421E-8286-7F7A49047DF9}" dt="2020-10-07T22:57:41.447" v="90" actId="6549"/>
+      <pc:sldChg chg="addSp modSp mod">
+        <pc:chgData name="Kara Wolley" userId="094e82877b283422" providerId="LiveId" clId="{41D813B1-577A-421E-8286-7F7A49047DF9}" dt="2020-10-09T17:31:55.315" v="1289" actId="1076"/>
         <pc:sldMkLst>
           <pc:docMk/>
           <pc:sldMk cId="1217790128" sldId="262"/>
         </pc:sldMkLst>
         <pc:spChg chg="mod">
-          <ac:chgData name="Kara Wolley" userId="094e82877b283422" providerId="LiveId" clId="{41D813B1-577A-421E-8286-7F7A49047DF9}" dt="2020-10-07T22:57:41.447" v="90" actId="6549"/>
+          <ac:chgData name="Kara Wolley" userId="094e82877b283422" providerId="LiveId" clId="{41D813B1-577A-421E-8286-7F7A49047DF9}" dt="2020-10-09T17:31:44.221" v="1285" actId="1076"/>
+          <ac:spMkLst>
+            <pc:docMk/>
+            <pc:sldMk cId="1217790128" sldId="262"/>
+            <ac:spMk id="2" creationId="{F0E25CA6-1EDC-DB4F-BC35-590A3CD316D2}"/>
+          </ac:spMkLst>
+        </pc:spChg>
+        <pc:spChg chg="mod">
+          <ac:chgData name="Kara Wolley" userId="094e82877b283422" providerId="LiveId" clId="{41D813B1-577A-421E-8286-7F7A49047DF9}" dt="2020-10-09T17:31:47.206" v="1286" actId="1076"/>
           <ac:spMkLst>
             <pc:docMk/>
             <pc:sldMk cId="1217790128" sldId="262"/>
             <ac:spMk id="3" creationId="{68558AF0-ED2E-2E4A-8B59-229D61E1E95F}"/>
           </ac:spMkLst>
         </pc:spChg>
+        <pc:spChg chg="add mod">
+          <ac:chgData name="Kara Wolley" userId="094e82877b283422" providerId="LiveId" clId="{41D813B1-577A-421E-8286-7F7A49047DF9}" dt="2020-10-09T17:31:52.049" v="1288" actId="1076"/>
+          <ac:spMkLst>
+            <pc:docMk/>
+            <pc:sldMk cId="1217790128" sldId="262"/>
+            <ac:spMk id="4" creationId="{207094ED-0930-452D-AAAA-C791662AFEA5}"/>
+          </ac:spMkLst>
+        </pc:spChg>
+        <pc:spChg chg="add mod">
+          <ac:chgData name="Kara Wolley" userId="094e82877b283422" providerId="LiveId" clId="{41D813B1-577A-421E-8286-7F7A49047DF9}" dt="2020-10-09T17:31:55.315" v="1289" actId="1076"/>
+          <ac:spMkLst>
+            <pc:docMk/>
+            <pc:sldMk cId="1217790128" sldId="262"/>
+            <ac:spMk id="5" creationId="{36BC888E-220A-4097-B500-10D4BFD11686}"/>
+          </ac:spMkLst>
+        </pc:spChg>
+      </pc:sldChg>
+      <pc:sldChg chg="addSp delSp modSp add mod">
+        <pc:chgData name="Kara Wolley" userId="094e82877b283422" providerId="LiveId" clId="{41D813B1-577A-421E-8286-7F7A49047DF9}" dt="2020-10-09T17:32:09.065" v="1292" actId="1076"/>
+        <pc:sldMkLst>
+          <pc:docMk/>
+          <pc:sldMk cId="381177287" sldId="263"/>
+        </pc:sldMkLst>
+        <pc:spChg chg="del mod">
+          <ac:chgData name="Kara Wolley" userId="094e82877b283422" providerId="LiveId" clId="{41D813B1-577A-421E-8286-7F7A49047DF9}" dt="2020-10-09T17:31:40.705" v="1284" actId="21"/>
+          <ac:spMkLst>
+            <pc:docMk/>
+            <pc:sldMk cId="381177287" sldId="263"/>
+            <ac:spMk id="2" creationId="{A91EC7C7-B6B3-1B42-B548-E24B98800315}"/>
+          </ac:spMkLst>
+        </pc:spChg>
+        <pc:spChg chg="del mod">
+          <ac:chgData name="Kara Wolley" userId="094e82877b283422" providerId="LiveId" clId="{41D813B1-577A-421E-8286-7F7A49047DF9}" dt="2020-10-09T17:31:40.705" v="1284" actId="21"/>
+          <ac:spMkLst>
+            <pc:docMk/>
+            <pc:sldMk cId="381177287" sldId="263"/>
+            <ac:spMk id="3" creationId="{63CDF0F7-E4FE-5E4A-B1A6-6715958B71AA}"/>
+          </ac:spMkLst>
+        </pc:spChg>
+        <pc:spChg chg="add del mod">
+          <ac:chgData name="Kara Wolley" userId="094e82877b283422" providerId="LiveId" clId="{41D813B1-577A-421E-8286-7F7A49047DF9}" dt="2020-10-09T17:32:01.350" v="1290" actId="478"/>
+          <ac:spMkLst>
+            <pc:docMk/>
+            <pc:sldMk cId="381177287" sldId="263"/>
+            <ac:spMk id="7" creationId="{2F84EBB5-4043-4E1D-B68D-E60796B5DD85}"/>
+          </ac:spMkLst>
+        </pc:spChg>
+        <pc:spChg chg="add del mod">
+          <ac:chgData name="Kara Wolley" userId="094e82877b283422" providerId="LiveId" clId="{41D813B1-577A-421E-8286-7F7A49047DF9}" dt="2020-10-09T17:32:02.773" v="1291" actId="478"/>
+          <ac:spMkLst>
+            <pc:docMk/>
+            <pc:sldMk cId="381177287" sldId="263"/>
+            <ac:spMk id="9" creationId="{65BC0345-553D-4016-A90A-275E13DD5C13}"/>
+          </ac:spMkLst>
+        </pc:spChg>
+        <pc:picChg chg="add mod modCrop">
+          <ac:chgData name="Kara Wolley" userId="094e82877b283422" providerId="LiveId" clId="{41D813B1-577A-421E-8286-7F7A49047DF9}" dt="2020-10-09T17:32:09.065" v="1292" actId="1076"/>
+          <ac:picMkLst>
+            <pc:docMk/>
+            <pc:sldMk cId="381177287" sldId="263"/>
+            <ac:picMk id="5" creationId="{B82412DA-0AAB-4885-9EFA-38AADF0AD307}"/>
+          </ac:picMkLst>
+        </pc:picChg>
       </pc:sldChg>
     </pc:docChg>
   </pc:docChgLst>
@@ -349,7 +436,7 @@
           <a:p>
             <a:fld id="{F4D57BDD-E64A-4D27-8978-82FFCA18A12C}" type="datetimeFigureOut">
               <a:rPr lang="en-US" smtClean="0"/>
-              <a:t>10/7/2020</a:t>
+              <a:t>10/9/2020</a:t>
             </a:fld>
             <a:endParaRPr lang="en-US"/>
           </a:p>
@@ -558,7 +645,7 @@
           <a:p>
             <a:fld id="{F4D57BDD-E64A-4D27-8978-82FFCA18A12C}" type="datetimeFigureOut">
               <a:rPr lang="en-US" smtClean="0"/>
-              <a:t>10/7/2020</a:t>
+              <a:t>10/9/2020</a:t>
             </a:fld>
             <a:endParaRPr lang="en-US"/>
           </a:p>
@@ -766,7 +853,7 @@
           <a:p>
             <a:fld id="{F4D57BDD-E64A-4D27-8978-82FFCA18A12C}" type="datetimeFigureOut">
               <a:rPr lang="en-US" smtClean="0"/>
-              <a:t>10/7/2020</a:t>
+              <a:t>10/9/2020</a:t>
             </a:fld>
             <a:endParaRPr lang="en-US"/>
           </a:p>
@@ -964,7 +1051,7 @@
           <a:p>
             <a:fld id="{F4D57BDD-E64A-4D27-8978-82FFCA18A12C}" type="datetimeFigureOut">
               <a:rPr lang="en-US" smtClean="0"/>
-              <a:t>10/7/2020</a:t>
+              <a:t>10/9/2020</a:t>
             </a:fld>
             <a:endParaRPr lang="en-US"/>
           </a:p>
@@ -1240,7 +1327,7 @@
           <a:p>
             <a:fld id="{F4D57BDD-E64A-4D27-8978-82FFCA18A12C}" type="datetimeFigureOut">
               <a:rPr lang="en-US" smtClean="0"/>
-              <a:t>10/7/2020</a:t>
+              <a:t>10/9/2020</a:t>
             </a:fld>
             <a:endParaRPr lang="en-US"/>
           </a:p>
@@ -1512,7 +1599,7 @@
           <a:p>
             <a:fld id="{F4D57BDD-E64A-4D27-8978-82FFCA18A12C}" type="datetimeFigureOut">
               <a:rPr lang="en-US" smtClean="0"/>
-              <a:t>10/7/2020</a:t>
+              <a:t>10/9/2020</a:t>
             </a:fld>
             <a:endParaRPr lang="en-US"/>
           </a:p>
@@ -1926,7 +2013,7 @@
           <a:p>
             <a:fld id="{F4D57BDD-E64A-4D27-8978-82FFCA18A12C}" type="datetimeFigureOut">
               <a:rPr lang="en-US" smtClean="0"/>
-              <a:t>10/7/2020</a:t>
+              <a:t>10/9/2020</a:t>
             </a:fld>
             <a:endParaRPr lang="en-US"/>
           </a:p>
@@ -2073,7 +2160,7 @@
           <a:p>
             <a:fld id="{F4D57BDD-E64A-4D27-8978-82FFCA18A12C}" type="datetimeFigureOut">
               <a:rPr lang="en-US" smtClean="0"/>
-              <a:t>10/7/2020</a:t>
+              <a:t>10/9/2020</a:t>
             </a:fld>
             <a:endParaRPr lang="en-US"/>
           </a:p>
@@ -2186,7 +2273,7 @@
           <a:p>
             <a:fld id="{F4D57BDD-E64A-4D27-8978-82FFCA18A12C}" type="datetimeFigureOut">
               <a:rPr lang="en-US" smtClean="0"/>
-              <a:t>10/7/2020</a:t>
+              <a:t>10/9/2020</a:t>
             </a:fld>
             <a:endParaRPr lang="en-US"/>
           </a:p>
@@ -2498,7 +2585,7 @@
           <a:p>
             <a:fld id="{F4D57BDD-E64A-4D27-8978-82FFCA18A12C}" type="datetimeFigureOut">
               <a:rPr lang="en-US" smtClean="0"/>
-              <a:t>10/7/2020</a:t>
+              <a:t>10/9/2020</a:t>
             </a:fld>
             <a:endParaRPr lang="en-US"/>
           </a:p>
@@ -2789,7 +2876,7 @@
           <a:p>
             <a:fld id="{F4D57BDD-E64A-4D27-8978-82FFCA18A12C}" type="datetimeFigureOut">
               <a:rPr lang="en-US" smtClean="0"/>
-              <a:t>10/7/2020</a:t>
+              <a:t>10/9/2020</a:t>
             </a:fld>
             <a:endParaRPr lang="en-US"/>
           </a:p>
@@ -3031,7 +3118,7 @@
             <a:fld id="{F4D57BDD-E64A-4D27-8978-82FFCA18A12C}" type="datetimeFigureOut">
               <a:rPr lang="en-US" smtClean="0"/>
               <a:pPr/>
-              <a:t>10/7/2020</a:t>
+              <a:t>10/9/2020</a:t>
             </a:fld>
             <a:endParaRPr lang="en-US" dirty="0"/>
           </a:p>
@@ -3961,7 +4048,7 @@
           <a:p>
             <a:r>
               <a:rPr lang="en-US" sz="2000" dirty="0"/>
-              <a:t>In states that vote Republican are there more or less UFO sightings?</a:t>
+              <a:t>Do states that vote Republican have significantly more UFO sightings?</a:t>
             </a:r>
           </a:p>
           <a:p>
@@ -4156,7 +4243,12 @@
             <p:ph type="title"/>
           </p:nvPr>
         </p:nvSpPr>
-        <p:spPr/>
+        <p:spPr>
+          <a:xfrm>
+            <a:off x="416312" y="267785"/>
+            <a:ext cx="9144000" cy="1263649"/>
+          </a:xfrm>
+        </p:spPr>
         <p:txBody>
           <a:bodyPr/>
           <a:lstStyle/>
@@ -4186,7 +4278,7 @@
         </p:nvSpPr>
         <p:spPr>
           <a:xfrm>
-            <a:off x="762000" y="2374901"/>
+            <a:off x="862361" y="980999"/>
             <a:ext cx="10668000" cy="3721100"/>
           </a:xfrm>
         </p:spPr>
@@ -4215,7 +4307,7 @@
             <a:pPr lvl="1"/>
             <a:r>
               <a:rPr lang="en-US" sz="2000" dirty="0"/>
-              <a:t>Available as csv files on Shelby Bearrows and Kara Wolley’s computer as well as on our GitHub page.</a:t>
+              <a:t>Available as csv files on personal computers of team members as well as on our GitHub page.</a:t>
             </a:r>
           </a:p>
           <a:p>
@@ -4238,7 +4330,7 @@
             <a:pPr lvl="1"/>
             <a:r>
               <a:rPr lang="en-US" sz="2000" dirty="0"/>
-              <a:t>Available as csv files on Shelby Bearrows’ computer and on our GitHub page.</a:t>
+              <a:t>Available as csv files on personal computers of team members and on our GitHub page.</a:t>
             </a:r>
           </a:p>
           <a:p>
@@ -4246,6 +4338,276 @@
               <a:rPr lang="en-US" sz="2000" dirty="0"/>
               <a:t>The merged dataset (“merged_ufo_elect_data.csv”) can be found on our GitHub</a:t>
             </a:r>
+          </a:p>
+        </p:txBody>
+      </p:sp>
+      <p:sp>
+        <p:nvSpPr>
+          <p:cNvPr id="4" name="Title 1">
+            <a:extLst>
+              <a:ext uri="{FF2B5EF4-FFF2-40B4-BE49-F238E27FC236}">
+                <a16:creationId xmlns:a16="http://schemas.microsoft.com/office/drawing/2014/main" id="{207094ED-0930-452D-AAAA-C791662AFEA5}"/>
+              </a:ext>
+            </a:extLst>
+          </p:cNvPr>
+          <p:cNvSpPr txBox="1">
+            <a:spLocks/>
+          </p:cNvSpPr>
+          <p:nvPr/>
+        </p:nvSpPr>
+        <p:spPr>
+          <a:xfrm>
+            <a:off x="416312" y="4330703"/>
+            <a:ext cx="9144000" cy="1263649"/>
+          </a:xfrm>
+          <a:prstGeom prst="rect">
+            <a:avLst/>
+          </a:prstGeom>
+        </p:spPr>
+        <p:txBody>
+          <a:bodyPr vert="horz" lIns="91440" tIns="45720" rIns="91440" bIns="45720" rtlCol="0" anchor="t" anchorCtr="0">
+            <a:normAutofit/>
+          </a:bodyPr>
+          <a:lstStyle>
+            <a:lvl1pPr algn="l" defTabSz="914400" rtl="0" eaLnBrk="1" latinLnBrk="0" hangingPunct="1">
+              <a:lnSpc>
+                <a:spcPct val="90000"/>
+              </a:lnSpc>
+              <a:spcBef>
+                <a:spcPct val="0"/>
+              </a:spcBef>
+              <a:buNone/>
+              <a:defRPr sz="4400" kern="1200">
+                <a:solidFill>
+                  <a:schemeClr val="tx1"/>
+                </a:solidFill>
+                <a:latin typeface="+mj-lt"/>
+                <a:ea typeface="+mj-ea"/>
+                <a:cs typeface="+mj-cs"/>
+              </a:defRPr>
+            </a:lvl1pPr>
+          </a:lstStyle>
+          <a:p>
+            <a:r>
+              <a:rPr lang="en-US"/>
+              <a:t>Tools</a:t>
+            </a:r>
+            <a:endParaRPr lang="en-US" dirty="0"/>
+          </a:p>
+        </p:txBody>
+      </p:sp>
+      <p:sp>
+        <p:nvSpPr>
+          <p:cNvPr id="5" name="Content Placeholder 2">
+            <a:extLst>
+              <a:ext uri="{FF2B5EF4-FFF2-40B4-BE49-F238E27FC236}">
+                <a16:creationId xmlns:a16="http://schemas.microsoft.com/office/drawing/2014/main" id="{36BC888E-220A-4097-B500-10D4BFD11686}"/>
+              </a:ext>
+            </a:extLst>
+          </p:cNvPr>
+          <p:cNvSpPr txBox="1">
+            <a:spLocks/>
+          </p:cNvSpPr>
+          <p:nvPr/>
+        </p:nvSpPr>
+        <p:spPr>
+          <a:xfrm>
+            <a:off x="1432931" y="5066214"/>
+            <a:ext cx="10668000" cy="3048001"/>
+          </a:xfrm>
+          <a:prstGeom prst="rect">
+            <a:avLst/>
+          </a:prstGeom>
+        </p:spPr>
+        <p:txBody>
+          <a:bodyPr vert="horz" lIns="91440" tIns="45720" rIns="91440" bIns="45720" rtlCol="0">
+            <a:normAutofit/>
+          </a:bodyPr>
+          <a:lstStyle>
+            <a:lvl1pPr marL="228600" indent="-228600" algn="l" defTabSz="914400" rtl="0" eaLnBrk="1" latinLnBrk="0" hangingPunct="1">
+              <a:lnSpc>
+                <a:spcPct val="90000"/>
+              </a:lnSpc>
+              <a:spcBef>
+                <a:spcPts val="1000"/>
+              </a:spcBef>
+              <a:buFont typeface="Arial" panose="020B0604020202020204" pitchFamily="34" charset="0"/>
+              <a:buChar char="•"/>
+              <a:defRPr sz="2800" kern="1200">
+                <a:solidFill>
+                  <a:schemeClr val="tx1"/>
+                </a:solidFill>
+                <a:latin typeface="+mn-lt"/>
+                <a:ea typeface="+mn-ea"/>
+                <a:cs typeface="+mn-cs"/>
+              </a:defRPr>
+            </a:lvl1pPr>
+            <a:lvl2pPr marL="685800" indent="-228600" algn="l" defTabSz="914400" rtl="0" eaLnBrk="1" latinLnBrk="0" hangingPunct="1">
+              <a:lnSpc>
+                <a:spcPct val="90000"/>
+              </a:lnSpc>
+              <a:spcBef>
+                <a:spcPts val="500"/>
+              </a:spcBef>
+              <a:buFont typeface="Arial" panose="020B0604020202020204" pitchFamily="34" charset="0"/>
+              <a:buChar char="•"/>
+              <a:defRPr sz="2400" kern="1200">
+                <a:solidFill>
+                  <a:schemeClr val="tx1"/>
+                </a:solidFill>
+                <a:latin typeface="+mn-lt"/>
+                <a:ea typeface="+mn-ea"/>
+                <a:cs typeface="+mn-cs"/>
+              </a:defRPr>
+            </a:lvl2pPr>
+            <a:lvl3pPr marL="1143000" indent="-228600" algn="l" defTabSz="914400" rtl="0" eaLnBrk="1" latinLnBrk="0" hangingPunct="1">
+              <a:lnSpc>
+                <a:spcPct val="90000"/>
+              </a:lnSpc>
+              <a:spcBef>
+                <a:spcPts val="500"/>
+              </a:spcBef>
+              <a:buFont typeface="Arial" panose="020B0604020202020204" pitchFamily="34" charset="0"/>
+              <a:buChar char="•"/>
+              <a:defRPr sz="2000" kern="1200">
+                <a:solidFill>
+                  <a:schemeClr val="tx1"/>
+                </a:solidFill>
+                <a:latin typeface="+mn-lt"/>
+                <a:ea typeface="+mn-ea"/>
+                <a:cs typeface="+mn-cs"/>
+              </a:defRPr>
+            </a:lvl3pPr>
+            <a:lvl4pPr marL="1600200" indent="-228600" algn="l" defTabSz="914400" rtl="0" eaLnBrk="1" latinLnBrk="0" hangingPunct="1">
+              <a:lnSpc>
+                <a:spcPct val="90000"/>
+              </a:lnSpc>
+              <a:spcBef>
+                <a:spcPts val="500"/>
+              </a:spcBef>
+              <a:buFont typeface="Arial" panose="020B0604020202020204" pitchFamily="34" charset="0"/>
+              <a:buChar char="•"/>
+              <a:defRPr sz="1800" kern="1200">
+                <a:solidFill>
+                  <a:schemeClr val="tx1"/>
+                </a:solidFill>
+                <a:latin typeface="+mn-lt"/>
+                <a:ea typeface="+mn-ea"/>
+                <a:cs typeface="+mn-cs"/>
+              </a:defRPr>
+            </a:lvl4pPr>
+            <a:lvl5pPr marL="2057400" indent="-228600" algn="l" defTabSz="914400" rtl="0" eaLnBrk="1" latinLnBrk="0" hangingPunct="1">
+              <a:lnSpc>
+                <a:spcPct val="90000"/>
+              </a:lnSpc>
+              <a:spcBef>
+                <a:spcPts val="500"/>
+              </a:spcBef>
+              <a:buFont typeface="Arial" panose="020B0604020202020204" pitchFamily="34" charset="0"/>
+              <a:buChar char="•"/>
+              <a:defRPr sz="1800" kern="1200">
+                <a:solidFill>
+                  <a:schemeClr val="tx1"/>
+                </a:solidFill>
+                <a:latin typeface="+mn-lt"/>
+                <a:ea typeface="+mn-ea"/>
+                <a:cs typeface="+mn-cs"/>
+              </a:defRPr>
+            </a:lvl5pPr>
+            <a:lvl6pPr marL="2514600" indent="-228600" algn="l" defTabSz="914400" rtl="0" eaLnBrk="1" latinLnBrk="0" hangingPunct="1">
+              <a:lnSpc>
+                <a:spcPct val="90000"/>
+              </a:lnSpc>
+              <a:spcBef>
+                <a:spcPts val="500"/>
+              </a:spcBef>
+              <a:buFont typeface="Arial" panose="020B0604020202020204" pitchFamily="34" charset="0"/>
+              <a:buChar char="•"/>
+              <a:defRPr sz="1800" kern="1200">
+                <a:solidFill>
+                  <a:schemeClr val="tx1"/>
+                </a:solidFill>
+                <a:latin typeface="+mn-lt"/>
+                <a:ea typeface="+mn-ea"/>
+                <a:cs typeface="+mn-cs"/>
+              </a:defRPr>
+            </a:lvl6pPr>
+            <a:lvl7pPr marL="2971800" indent="-228600" algn="l" defTabSz="914400" rtl="0" eaLnBrk="1" latinLnBrk="0" hangingPunct="1">
+              <a:lnSpc>
+                <a:spcPct val="90000"/>
+              </a:lnSpc>
+              <a:spcBef>
+                <a:spcPts val="500"/>
+              </a:spcBef>
+              <a:buFont typeface="Arial" panose="020B0604020202020204" pitchFamily="34" charset="0"/>
+              <a:buChar char="•"/>
+              <a:defRPr sz="1800" kern="1200">
+                <a:solidFill>
+                  <a:schemeClr val="tx1"/>
+                </a:solidFill>
+                <a:latin typeface="+mn-lt"/>
+                <a:ea typeface="+mn-ea"/>
+                <a:cs typeface="+mn-cs"/>
+              </a:defRPr>
+            </a:lvl7pPr>
+            <a:lvl8pPr marL="3429000" indent="-228600" algn="l" defTabSz="914400" rtl="0" eaLnBrk="1" latinLnBrk="0" hangingPunct="1">
+              <a:lnSpc>
+                <a:spcPct val="90000"/>
+              </a:lnSpc>
+              <a:spcBef>
+                <a:spcPts val="500"/>
+              </a:spcBef>
+              <a:buFont typeface="Arial" panose="020B0604020202020204" pitchFamily="34" charset="0"/>
+              <a:buChar char="•"/>
+              <a:defRPr sz="1800" kern="1200">
+                <a:solidFill>
+                  <a:schemeClr val="tx1"/>
+                </a:solidFill>
+                <a:latin typeface="+mn-lt"/>
+                <a:ea typeface="+mn-ea"/>
+                <a:cs typeface="+mn-cs"/>
+              </a:defRPr>
+            </a:lvl8pPr>
+            <a:lvl9pPr marL="3886200" indent="-228600" algn="l" defTabSz="914400" rtl="0" eaLnBrk="1" latinLnBrk="0" hangingPunct="1">
+              <a:lnSpc>
+                <a:spcPct val="90000"/>
+              </a:lnSpc>
+              <a:spcBef>
+                <a:spcPts val="500"/>
+              </a:spcBef>
+              <a:buFont typeface="Arial" panose="020B0604020202020204" pitchFamily="34" charset="0"/>
+              <a:buChar char="•"/>
+              <a:defRPr sz="1800" kern="1200">
+                <a:solidFill>
+                  <a:schemeClr val="tx1"/>
+                </a:solidFill>
+                <a:latin typeface="+mn-lt"/>
+                <a:ea typeface="+mn-ea"/>
+                <a:cs typeface="+mn-cs"/>
+              </a:defRPr>
+            </a:lvl9pPr>
+          </a:lstStyle>
+          <a:p>
+            <a:r>
+              <a:rPr lang="en-US" dirty="0"/>
+              <a:t>Python</a:t>
+            </a:r>
+          </a:p>
+          <a:p>
+            <a:r>
+              <a:rPr lang="en-US" dirty="0"/>
+              <a:t>Tableau</a:t>
+            </a:r>
+          </a:p>
+          <a:p>
+            <a:r>
+              <a:rPr lang="en-US" dirty="0" err="1"/>
+              <a:t>Matlab</a:t>
+            </a:r>
+            <a:endParaRPr lang="en-US" dirty="0"/>
+          </a:p>
+          <a:p>
+            <a:endParaRPr lang="en-US" dirty="0"/>
           </a:p>
         </p:txBody>
       </p:sp>
@@ -4344,7 +4706,7 @@
             <a:pPr lvl="1"/>
             <a:r>
               <a:rPr lang="en-US" sz="1600" dirty="0"/>
-              <a:t>The UFO dataset is especially 'dirty’. Reformatting of dates, state name and removal of random symbols (&amp;, !, #) from the comments attribute is necessary. Cleaning will be necessary prior to merging with the US Elections dataset. The US Elections dataset seems much cleaner but likely will need some cleaning. </a:t>
+              <a:t>The UFO dataset is especially 'dirty’. Reformatting of dates, state name and removal of random symbols (&amp;, !, #) from the comments attribute is necessary. Cleaning will be necessary prior to merging with the US Elections dataset. The US Elections dataset appears to be much cleaner. </a:t>
             </a:r>
           </a:p>
           <a:p>
@@ -4358,6 +4720,13 @@
             <a:r>
               <a:rPr lang="en-US" sz="1600" dirty="0"/>
               <a:t>Correct for missing values. Some values may remain null, but many are predictable, such as if the 'county' value for a row of data is blank, but we know the state is 'TX,' it's safe to input the USA for the country value.</a:t>
+            </a:r>
+          </a:p>
+          <a:p>
+            <a:pPr lvl="1"/>
+            <a:r>
+              <a:rPr lang="en-US" sz="1600" dirty="0"/>
+              <a:t>Identify erroneous data and outliers.</a:t>
             </a:r>
           </a:p>
           <a:p>
@@ -4460,19 +4829,19 @@
         </p:spPr>
         <p:txBody>
           <a:bodyPr>
-            <a:normAutofit/>
+            <a:normAutofit fontScale="92500" lnSpcReduction="10000"/>
           </a:bodyPr>
           <a:lstStyle/>
           <a:p>
             <a:r>
               <a:rPr lang="en-US" dirty="0"/>
-              <a:t>Histogram</a:t>
+              <a:t>Histograms to identify classification of UFO shape or visualizations by election terms (bins of years)</a:t>
             </a:r>
           </a:p>
           <a:p>
             <a:r>
               <a:rPr lang="en-US" dirty="0"/>
-              <a:t>Heatmap</a:t>
+              <a:t>Heatmaps to visualize geographical location of UFO sightings to support hypotheses.</a:t>
             </a:r>
           </a:p>
           <a:p>
@@ -4480,13 +4849,25 @@
               <a:rPr lang="en-US" dirty="0" err="1"/>
               <a:t>Apiori</a:t>
             </a:r>
+            <a:r>
+              <a:rPr lang="en-US" dirty="0"/>
+              <a:t> to quantify minimal support </a:t>
+            </a:r>
+          </a:p>
+          <a:p>
+            <a:r>
+              <a:rPr lang="en-US" dirty="0"/>
+              <a:t>Correlation measures including Pearson’s and lift.</a:t>
+            </a:r>
+          </a:p>
+          <a:p>
+            <a:r>
+              <a:rPr lang="en-US" dirty="0"/>
+              <a:t>Student t test for the comparison of means</a:t>
+            </a:r>
+          </a:p>
+          <a:p>
             <a:endParaRPr lang="en-US" dirty="0"/>
-          </a:p>
-          <a:p>
-            <a:r>
-              <a:rPr lang="en-US" dirty="0"/>
-              <a:t>Gain/lift</a:t>
-            </a:r>
           </a:p>
         </p:txBody>
       </p:sp>
@@ -4494,6 +4875,65 @@
     <p:extLst>
       <p:ext uri="{BB962C8B-B14F-4D97-AF65-F5344CB8AC3E}">
         <p14:creationId xmlns:p14="http://schemas.microsoft.com/office/powerpoint/2010/main" val="818987504"/>
+      </p:ext>
+    </p:extLst>
+  </p:cSld>
+  <p:clrMapOvr>
+    <a:masterClrMapping/>
+  </p:clrMapOvr>
+</p:sld>
+</file>
+
+<file path=ppt/slides/slide8.xml><?xml version="1.0" encoding="utf-8"?>
+<p:sld xmlns:a="http://schemas.openxmlformats.org/drawingml/2006/main" xmlns:r="http://schemas.openxmlformats.org/officeDocument/2006/relationships" xmlns:p="http://schemas.openxmlformats.org/presentationml/2006/main">
+  <p:cSld>
+    <p:spTree>
+      <p:nvGrpSpPr>
+        <p:cNvPr id="1" name=""/>
+        <p:cNvGrpSpPr/>
+        <p:nvPr/>
+      </p:nvGrpSpPr>
+      <p:grpSpPr>
+        <a:xfrm>
+          <a:off x="0" y="0"/>
+          <a:ext cx="0" cy="0"/>
+          <a:chOff x="0" y="0"/>
+          <a:chExt cx="0" cy="0"/>
+        </a:xfrm>
+      </p:grpSpPr>
+      <p:pic>
+        <p:nvPicPr>
+          <p:cNvPr id="5" name="Picture 4">
+            <a:extLst>
+              <a:ext uri="{FF2B5EF4-FFF2-40B4-BE49-F238E27FC236}">
+                <a16:creationId xmlns:a16="http://schemas.microsoft.com/office/drawing/2014/main" id="{B82412DA-0AAB-4885-9EFA-38AADF0AD307}"/>
+              </a:ext>
+            </a:extLst>
+          </p:cNvPr>
+          <p:cNvPicPr>
+            <a:picLocks noChangeAspect="1"/>
+          </p:cNvPicPr>
+          <p:nvPr/>
+        </p:nvPicPr>
+        <p:blipFill rotWithShape="1">
+          <a:blip r:embed="rId2"/>
+          <a:srcRect b="7805"/>
+          <a:stretch/>
+        </p:blipFill>
+        <p:spPr>
+          <a:xfrm>
+            <a:off x="3156724" y="719131"/>
+            <a:ext cx="5878551" cy="5419737"/>
+          </a:xfrm>
+          <a:prstGeom prst="rect">
+            <a:avLst/>
+          </a:prstGeom>
+        </p:spPr>
+      </p:pic>
+    </p:spTree>
+    <p:extLst>
+      <p:ext uri="{BB962C8B-B14F-4D97-AF65-F5344CB8AC3E}">
+        <p14:creationId xmlns:p14="http://schemas.microsoft.com/office/powerpoint/2010/main" val="381177287"/>
       </p:ext>
     </p:extLst>
   </p:cSld>

</xml_diff>